<commit_message>
A little more clarity on the functional overview
</commit_message>
<xml_diff>
--- a/AVX-Framework.pptx
+++ b/AVX-Framework.pptx
@@ -264,7 +264,7 @@
           <a:p>
             <a:fld id="{00872148-4BA6-4738-8A8B-AEF1C14E9646}" type="datetimeFigureOut">
               <a:rPr lang="en-US" smtClean="0"/>
-              <a:t>12/20/2023</a:t>
+              <a:t>12/21/2023</a:t>
             </a:fld>
             <a:endParaRPr lang="en-US"/>
           </a:p>
@@ -462,7 +462,7 @@
           <a:p>
             <a:fld id="{00872148-4BA6-4738-8A8B-AEF1C14E9646}" type="datetimeFigureOut">
               <a:rPr lang="en-US" smtClean="0"/>
-              <a:t>12/20/2023</a:t>
+              <a:t>12/21/2023</a:t>
             </a:fld>
             <a:endParaRPr lang="en-US"/>
           </a:p>
@@ -670,7 +670,7 @@
           <a:p>
             <a:fld id="{00872148-4BA6-4738-8A8B-AEF1C14E9646}" type="datetimeFigureOut">
               <a:rPr lang="en-US" smtClean="0"/>
-              <a:t>12/20/2023</a:t>
+              <a:t>12/21/2023</a:t>
             </a:fld>
             <a:endParaRPr lang="en-US"/>
           </a:p>
@@ -868,7 +868,7 @@
           <a:p>
             <a:fld id="{00872148-4BA6-4738-8A8B-AEF1C14E9646}" type="datetimeFigureOut">
               <a:rPr lang="en-US" smtClean="0"/>
-              <a:t>12/20/2023</a:t>
+              <a:t>12/21/2023</a:t>
             </a:fld>
             <a:endParaRPr lang="en-US"/>
           </a:p>
@@ -1143,7 +1143,7 @@
           <a:p>
             <a:fld id="{00872148-4BA6-4738-8A8B-AEF1C14E9646}" type="datetimeFigureOut">
               <a:rPr lang="en-US" smtClean="0"/>
-              <a:t>12/20/2023</a:t>
+              <a:t>12/21/2023</a:t>
             </a:fld>
             <a:endParaRPr lang="en-US"/>
           </a:p>
@@ -1408,7 +1408,7 @@
           <a:p>
             <a:fld id="{00872148-4BA6-4738-8A8B-AEF1C14E9646}" type="datetimeFigureOut">
               <a:rPr lang="en-US" smtClean="0"/>
-              <a:t>12/20/2023</a:t>
+              <a:t>12/21/2023</a:t>
             </a:fld>
             <a:endParaRPr lang="en-US"/>
           </a:p>
@@ -1820,7 +1820,7 @@
           <a:p>
             <a:fld id="{00872148-4BA6-4738-8A8B-AEF1C14E9646}" type="datetimeFigureOut">
               <a:rPr lang="en-US" smtClean="0"/>
-              <a:t>12/20/2023</a:t>
+              <a:t>12/21/2023</a:t>
             </a:fld>
             <a:endParaRPr lang="en-US"/>
           </a:p>
@@ -1961,7 +1961,7 @@
           <a:p>
             <a:fld id="{00872148-4BA6-4738-8A8B-AEF1C14E9646}" type="datetimeFigureOut">
               <a:rPr lang="en-US" smtClean="0"/>
-              <a:t>12/20/2023</a:t>
+              <a:t>12/21/2023</a:t>
             </a:fld>
             <a:endParaRPr lang="en-US"/>
           </a:p>
@@ -2074,7 +2074,7 @@
           <a:p>
             <a:fld id="{00872148-4BA6-4738-8A8B-AEF1C14E9646}" type="datetimeFigureOut">
               <a:rPr lang="en-US" smtClean="0"/>
-              <a:t>12/20/2023</a:t>
+              <a:t>12/21/2023</a:t>
             </a:fld>
             <a:endParaRPr lang="en-US"/>
           </a:p>
@@ -2385,7 +2385,7 @@
           <a:p>
             <a:fld id="{00872148-4BA6-4738-8A8B-AEF1C14E9646}" type="datetimeFigureOut">
               <a:rPr lang="en-US" smtClean="0"/>
-              <a:t>12/20/2023</a:t>
+              <a:t>12/21/2023</a:t>
             </a:fld>
             <a:endParaRPr lang="en-US"/>
           </a:p>
@@ -2673,7 +2673,7 @@
           <a:p>
             <a:fld id="{00872148-4BA6-4738-8A8B-AEF1C14E9646}" type="datetimeFigureOut">
               <a:rPr lang="en-US" smtClean="0"/>
-              <a:t>12/20/2023</a:t>
+              <a:t>12/21/2023</a:t>
             </a:fld>
             <a:endParaRPr lang="en-US"/>
           </a:p>
@@ -2914,7 +2914,7 @@
           <a:p>
             <a:fld id="{00872148-4BA6-4738-8A8B-AEF1C14E9646}" type="datetimeFigureOut">
               <a:rPr lang="en-US" smtClean="0"/>
-              <a:t>12/20/2023</a:t>
+              <a:t>12/21/2023</a:t>
             </a:fld>
             <a:endParaRPr lang="en-US"/>
           </a:p>
@@ -3387,9 +3387,10 @@
           </a:p>
           <a:p>
             <a:r>
-              <a:rPr lang="en-US" sz="1800" dirty="0"/>
-              <a:t>12-20-2023</a:t>
+              <a:rPr lang="en-US" sz="1800"/>
+              <a:t>12-21-2023</a:t>
             </a:r>
+            <a:endParaRPr lang="en-US" sz="1800" dirty="0"/>
           </a:p>
         </p:txBody>
       </p:sp>
@@ -16729,7 +16730,7 @@
         </p:nvSpPr>
         <p:spPr>
           <a:xfrm>
-            <a:off x="2319587" y="3546798"/>
+            <a:off x="1732101" y="2469469"/>
             <a:ext cx="920338" cy="653143"/>
           </a:xfrm>
           <a:prstGeom prst="rect">
@@ -16782,7 +16783,7 @@
         </p:nvGrpSpPr>
         <p:grpSpPr>
           <a:xfrm>
-            <a:off x="1220961" y="3475545"/>
+            <a:off x="633475" y="2398216"/>
             <a:ext cx="389165" cy="795647"/>
             <a:chOff x="1238127" y="3532909"/>
             <a:chExt cx="389165" cy="795647"/>
@@ -17008,7 +17009,7 @@
         </p:nvCxnSpPr>
         <p:spPr>
           <a:xfrm flipV="1">
-            <a:off x="1610126" y="3873370"/>
+            <a:off x="1022640" y="2796041"/>
             <a:ext cx="709461" cy="7540"/>
           </a:xfrm>
           <a:prstGeom prst="straightConnector1">
@@ -17051,7 +17052,7 @@
         </p:nvCxnSpPr>
         <p:spPr>
           <a:xfrm flipV="1">
-            <a:off x="3239925" y="3872605"/>
+            <a:off x="2652439" y="2795276"/>
             <a:ext cx="688027" cy="765"/>
           </a:xfrm>
           <a:prstGeom prst="straightConnector1">
@@ -17090,7 +17091,7 @@
         </p:nvGrpSpPr>
         <p:grpSpPr>
           <a:xfrm>
-            <a:off x="3866062" y="3481586"/>
+            <a:off x="3278576" y="2404257"/>
             <a:ext cx="658521" cy="928585"/>
             <a:chOff x="4230298" y="3615014"/>
             <a:chExt cx="658521" cy="928585"/>
@@ -17601,7 +17602,7 @@
         </p:nvSpPr>
         <p:spPr>
           <a:xfrm>
-            <a:off x="4998249" y="3546797"/>
+            <a:off x="4410763" y="2469468"/>
             <a:ext cx="920338" cy="653143"/>
           </a:xfrm>
           <a:prstGeom prst="rect">
@@ -17657,7 +17658,7 @@
         </p:nvGrpSpPr>
         <p:grpSpPr>
           <a:xfrm>
-            <a:off x="6532112" y="3481586"/>
+            <a:off x="5944626" y="2404257"/>
             <a:ext cx="658521" cy="928585"/>
             <a:chOff x="6896348" y="3590179"/>
             <a:chExt cx="658521" cy="928585"/>
@@ -18167,7 +18168,7 @@
         </p:nvCxnSpPr>
         <p:spPr>
           <a:xfrm flipV="1">
-            <a:off x="5918587" y="3872605"/>
+            <a:off x="5331101" y="2795276"/>
             <a:ext cx="675415" cy="764"/>
           </a:xfrm>
           <a:prstGeom prst="straightConnector1">
@@ -18210,7 +18211,7 @@
         </p:nvCxnSpPr>
         <p:spPr>
           <a:xfrm>
-            <a:off x="4391090" y="3872605"/>
+            <a:off x="3803604" y="2795276"/>
             <a:ext cx="607159" cy="764"/>
           </a:xfrm>
           <a:prstGeom prst="straightConnector1">
@@ -18249,7 +18250,7 @@
         </p:nvSpPr>
         <p:spPr>
           <a:xfrm>
-            <a:off x="7681193" y="3546032"/>
+            <a:off x="7093707" y="2468703"/>
             <a:ext cx="920338" cy="653143"/>
           </a:xfrm>
           <a:prstGeom prst="rect">
@@ -18301,7 +18302,7 @@
         </p:nvCxnSpPr>
         <p:spPr>
           <a:xfrm flipV="1">
-            <a:off x="7057140" y="3872604"/>
+            <a:off x="6469654" y="2795275"/>
             <a:ext cx="624053" cy="1"/>
           </a:xfrm>
           <a:prstGeom prst="straightConnector1">
@@ -18340,7 +18341,7 @@
         </p:nvSpPr>
         <p:spPr>
           <a:xfrm>
-            <a:off x="1628875" y="3678216"/>
+            <a:off x="1041389" y="2600887"/>
             <a:ext cx="677145" cy="389850"/>
           </a:xfrm>
           <a:prstGeom prst="rect">
@@ -18418,7 +18419,7 @@
         </p:nvGrpSpPr>
         <p:grpSpPr>
           <a:xfrm>
-            <a:off x="9082181" y="3429000"/>
+            <a:off x="8494695" y="2351671"/>
             <a:ext cx="658521" cy="1082474"/>
             <a:chOff x="6896348" y="3590179"/>
             <a:chExt cx="658521" cy="1082474"/>
@@ -18942,7 +18943,7 @@
         </p:nvCxnSpPr>
         <p:spPr>
           <a:xfrm flipH="1">
-            <a:off x="9607209" y="3820018"/>
+            <a:off x="9019723" y="2742689"/>
             <a:ext cx="488298" cy="1"/>
           </a:xfrm>
           <a:prstGeom prst="straightConnector1">
@@ -18981,7 +18982,7 @@
         </p:nvSpPr>
         <p:spPr>
           <a:xfrm>
-            <a:off x="10111450" y="3524527"/>
+            <a:off x="9523964" y="2447198"/>
             <a:ext cx="920338" cy="653143"/>
           </a:xfrm>
           <a:prstGeom prst="rect">
@@ -19035,7 +19036,7 @@
         </p:nvCxnSpPr>
         <p:spPr>
           <a:xfrm rot="5400000" flipH="1" flipV="1">
-            <a:off x="8600245" y="2438798"/>
+            <a:off x="8012759" y="1361469"/>
             <a:ext cx="232501" cy="3710246"/>
           </a:xfrm>
           <a:prstGeom prst="bentConnector3">
@@ -19078,7 +19079,7 @@
         </p:nvCxnSpPr>
         <p:spPr>
           <a:xfrm flipH="1">
-            <a:off x="8602770" y="3856367"/>
+            <a:off x="8015284" y="2779038"/>
             <a:ext cx="488298" cy="1"/>
           </a:xfrm>
           <a:prstGeom prst="straightConnector1">
@@ -19119,7 +19120,7 @@
         </p:nvCxnSpPr>
         <p:spPr>
           <a:xfrm rot="16200000" flipV="1">
-            <a:off x="5386517" y="-558437"/>
+            <a:off x="4799031" y="-1635766"/>
             <a:ext cx="28293" cy="7949954"/>
           </a:xfrm>
           <a:prstGeom prst="bentConnector3">
@@ -19146,6 +19147,400 @@
           </a:fontRef>
         </p:style>
       </p:cxnSp>
+      <p:graphicFrame>
+        <p:nvGraphicFramePr>
+          <p:cNvPr id="36" name="Table 35">
+            <a:extLst>
+              <a:ext uri="{FF2B5EF4-FFF2-40B4-BE49-F238E27FC236}">
+                <a16:creationId xmlns:a16="http://schemas.microsoft.com/office/drawing/2014/main" id="{422FB82A-7DB4-5C34-AD25-EA99C3F090F7}"/>
+              </a:ext>
+            </a:extLst>
+          </p:cNvPr>
+          <p:cNvGraphicFramePr>
+            <a:graphicFrameLocks noGrp="1"/>
+          </p:cNvGraphicFramePr>
+          <p:nvPr>
+            <p:extLst>
+              <p:ext uri="{D42A27DB-BD31-4B8C-83A1-F6EECF244321}">
+                <p14:modId xmlns:p14="http://schemas.microsoft.com/office/powerpoint/2010/main" val="21848369"/>
+              </p:ext>
+            </p:extLst>
+          </p:nvPr>
+        </p:nvGraphicFramePr>
+        <p:xfrm>
+          <a:off x="608872" y="3919934"/>
+          <a:ext cx="10974256" cy="2626360"/>
+        </p:xfrm>
+        <a:graphic>
+          <a:graphicData uri="http://schemas.openxmlformats.org/drawingml/2006/table">
+            <a:tbl>
+              <a:tblPr firstRow="1" bandRow="1">
+                <a:tableStyleId>{5C22544A-7EE6-4342-B048-85BDC9FD1C3A}</a:tableStyleId>
+              </a:tblPr>
+              <a:tblGrid>
+                <a:gridCol w="2743564">
+                  <a:extLst>
+                    <a:ext uri="{9D8B030D-6E8A-4147-A177-3AD203B41FA5}">
+                      <a16:colId xmlns:a16="http://schemas.microsoft.com/office/drawing/2014/main" val="417674019"/>
+                    </a:ext>
+                  </a:extLst>
+                </a:gridCol>
+                <a:gridCol w="2743564">
+                  <a:extLst>
+                    <a:ext uri="{9D8B030D-6E8A-4147-A177-3AD203B41FA5}">
+                      <a16:colId xmlns:a16="http://schemas.microsoft.com/office/drawing/2014/main" val="4205899314"/>
+                    </a:ext>
+                  </a:extLst>
+                </a:gridCol>
+                <a:gridCol w="2743564">
+                  <a:extLst>
+                    <a:ext uri="{9D8B030D-6E8A-4147-A177-3AD203B41FA5}">
+                      <a16:colId xmlns:a16="http://schemas.microsoft.com/office/drawing/2014/main" val="4246703558"/>
+                    </a:ext>
+                  </a:extLst>
+                </a:gridCol>
+                <a:gridCol w="2743564">
+                  <a:extLst>
+                    <a:ext uri="{9D8B030D-6E8A-4147-A177-3AD203B41FA5}">
+                      <a16:colId xmlns:a16="http://schemas.microsoft.com/office/drawing/2014/main" val="106070371"/>
+                    </a:ext>
+                  </a:extLst>
+                </a:gridCol>
+              </a:tblGrid>
+              <a:tr h="370840">
+                <a:tc>
+                  <a:txBody>
+                    <a:bodyPr/>
+                    <a:lstStyle/>
+                    <a:p>
+                      <a:pPr algn="ctr"/>
+                      <a:r>
+                        <a:rPr lang="en-US" dirty="0" err="1"/>
+                        <a:t>Pinshot</a:t>
+                      </a:r>
+                      <a:r>
+                        <a:rPr lang="en-US" dirty="0"/>
+                        <a:t>-Blue</a:t>
+                      </a:r>
+                    </a:p>
+                  </a:txBody>
+                  <a:tcPr/>
+                </a:tc>
+                <a:tc>
+                  <a:txBody>
+                    <a:bodyPr/>
+                    <a:lstStyle/>
+                    <a:p>
+                      <a:pPr algn="ctr"/>
+                      <a:r>
+                        <a:rPr lang="en-US" dirty="0"/>
+                        <a:t>Blueprint-Blue</a:t>
+                      </a:r>
+                    </a:p>
+                  </a:txBody>
+                  <a:tcPr/>
+                </a:tc>
+                <a:tc>
+                  <a:txBody>
+                    <a:bodyPr/>
+                    <a:lstStyle/>
+                    <a:p>
+                      <a:pPr algn="ctr"/>
+                      <a:r>
+                        <a:rPr lang="en-US" dirty="0"/>
+                        <a:t>AV-Engine</a:t>
+                      </a:r>
+                    </a:p>
+                  </a:txBody>
+                  <a:tcPr/>
+                </a:tc>
+                <a:tc>
+                  <a:txBody>
+                    <a:bodyPr/>
+                    <a:lstStyle/>
+                    <a:p>
+                      <a:pPr algn="ctr"/>
+                      <a:r>
+                        <a:rPr lang="en-US" dirty="0"/>
+                        <a:t>AV-Search</a:t>
+                      </a:r>
+                    </a:p>
+                  </a:txBody>
+                  <a:tcPr/>
+                </a:tc>
+                <a:extLst>
+                  <a:ext uri="{0D108BD9-81ED-4DB2-BD59-A6C34878D82A}">
+                    <a16:rowId xmlns:a16="http://schemas.microsoft.com/office/drawing/2014/main" val="1145141386"/>
+                  </a:ext>
+                </a:extLst>
+              </a:tr>
+              <a:tr h="370840">
+                <a:tc>
+                  <a:txBody>
+                    <a:bodyPr/>
+                    <a:lstStyle/>
+                    <a:p>
+                      <a:r>
+                        <a:rPr lang="en-US" sz="1000" dirty="0"/>
+                        <a:t>A specialized PEG grammar is used to parse the Quelle command</a:t>
+                      </a:r>
+                    </a:p>
+                  </a:txBody>
+                  <a:tcPr/>
+                </a:tc>
+                <a:tc>
+                  <a:txBody>
+                    <a:bodyPr/>
+                    <a:lstStyle/>
+                    <a:p>
+                      <a:r>
+                        <a:rPr lang="en-US" sz="1000" dirty="0"/>
+                        <a:t>The </a:t>
+                      </a:r>
+                      <a:r>
+                        <a:rPr lang="en-US" sz="1000" dirty="0" err="1"/>
+                        <a:t>pinshot</a:t>
+                      </a:r>
+                      <a:r>
+                        <a:rPr lang="en-US" sz="1000" dirty="0"/>
+                        <a:t> is transformed into a runtime object model.</a:t>
+                      </a:r>
+                    </a:p>
+                  </a:txBody>
+                  <a:tcPr/>
+                </a:tc>
+                <a:tc>
+                  <a:txBody>
+                    <a:bodyPr/>
+                    <a:lstStyle/>
+                    <a:p>
+                      <a:r>
+                        <a:rPr lang="en-US" sz="1000" dirty="0"/>
+                        <a:t>local processing (non-search) is executed in AV-Engine. This includes applying new labels to segments and capturing the command into </a:t>
+                      </a:r>
+                      <a:r>
+                        <a:rPr lang="en-US" sz="1000" dirty="0" err="1"/>
+                        <a:t>history.yaml</a:t>
+                      </a:r>
+                      <a:r>
+                        <a:rPr lang="en-US" sz="1000" dirty="0"/>
+                        <a:t>. AV-Engine also uses </a:t>
+                      </a:r>
+                      <a:r>
+                        <a:rPr lang="en-US" sz="1000" dirty="0" err="1"/>
+                        <a:t>precendence</a:t>
+                      </a:r>
+                      <a:r>
+                        <a:rPr lang="en-US" sz="1000" dirty="0"/>
+                        <a:t> rules [per segment] to create one </a:t>
+                      </a:r>
+                      <a:r>
+                        <a:rPr lang="en-US" sz="1000" dirty="0" err="1"/>
+                        <a:t>QSettings</a:t>
+                      </a:r>
+                      <a:r>
+                        <a:rPr lang="en-US" sz="1000" dirty="0"/>
+                        <a:t> object per segment.</a:t>
+                      </a:r>
+                    </a:p>
+                  </a:txBody>
+                  <a:tcPr/>
+                </a:tc>
+                <a:tc>
+                  <a:txBody>
+                    <a:bodyPr/>
+                    <a:lstStyle/>
+                    <a:p>
+                      <a:r>
+                        <a:rPr lang="en-US" sz="1000" dirty="0"/>
+                        <a:t>The </a:t>
+                      </a:r>
+                      <a:r>
+                        <a:rPr lang="en-US" sz="1000" dirty="0" err="1"/>
+                        <a:t>QImplicitCommands</a:t>
+                      </a:r>
+                      <a:r>
+                        <a:rPr lang="en-US" sz="1000" dirty="0"/>
+                        <a:t> object is transformed into a barebones </a:t>
+                      </a:r>
+                      <a:r>
+                        <a:rPr lang="en-US" sz="1000" dirty="0" err="1"/>
+                        <a:t>Tquery</a:t>
+                      </a:r>
+                      <a:r>
+                        <a:rPr lang="en-US" sz="1000" dirty="0"/>
+                        <a:t> object. A search is executed that fully populates all the summary information for the search results.</a:t>
+                      </a:r>
+                    </a:p>
+                  </a:txBody>
+                  <a:tcPr/>
+                </a:tc>
+                <a:extLst>
+                  <a:ext uri="{0D108BD9-81ED-4DB2-BD59-A6C34878D82A}">
+                    <a16:rowId xmlns:a16="http://schemas.microsoft.com/office/drawing/2014/main" val="1837705703"/>
+                  </a:ext>
+                </a:extLst>
+              </a:tr>
+              <a:tr h="370840">
+                <a:tc>
+                  <a:txBody>
+                    <a:bodyPr/>
+                    <a:lstStyle/>
+                    <a:p>
+                      <a:pPr marL="0" marR="0" lvl="0" indent="0" algn="l" defTabSz="914400" rtl="0" eaLnBrk="1" fontAlgn="auto" latinLnBrk="0" hangingPunct="1">
+                        <a:lnSpc>
+                          <a:spcPct val="100000"/>
+                        </a:lnSpc>
+                        <a:spcBef>
+                          <a:spcPts val="0"/>
+                        </a:spcBef>
+                        <a:spcAft>
+                          <a:spcPts val="0"/>
+                        </a:spcAft>
+                        <a:buClrTx/>
+                        <a:buSzTx/>
+                        <a:buFontTx/>
+                        <a:buNone/>
+                        <a:tabLst/>
+                        <a:defRPr/>
+                      </a:pPr>
+                      <a:r>
+                        <a:rPr lang="en-US" sz="1000" dirty="0"/>
+                        <a:t>Return JSON representation of the Quelle command</a:t>
+                      </a:r>
+                    </a:p>
+                  </a:txBody>
+                  <a:tcPr/>
+                </a:tc>
+                <a:tc>
+                  <a:txBody>
+                    <a:bodyPr/>
+                    <a:lstStyle/>
+                    <a:p>
+                      <a:r>
+                        <a:rPr lang="en-US" sz="1000" dirty="0"/>
+                        <a:t>Any macro or history invocations are expanded into the appropriate object model properties.</a:t>
+                      </a:r>
+                    </a:p>
+                  </a:txBody>
+                  <a:tcPr/>
+                </a:tc>
+                <a:tc>
+                  <a:txBody>
+                    <a:bodyPr/>
+                    <a:lstStyle/>
+                    <a:p>
+                      <a:r>
+                        <a:rPr lang="en-US" sz="1000" dirty="0"/>
+                        <a:t>After processing local components of the Quelle command, AV-Engine passes </a:t>
+                      </a:r>
+                      <a:r>
+                        <a:rPr lang="en-US" sz="1000" dirty="0" err="1"/>
+                        <a:t>QImplicitCommands</a:t>
+                      </a:r>
+                      <a:r>
+                        <a:rPr lang="en-US" sz="1000" dirty="0"/>
+                        <a:t> property of the blueprint to AV-Search, for complex search processing.</a:t>
+                      </a:r>
+                    </a:p>
+                  </a:txBody>
+                  <a:tcPr/>
+                </a:tc>
+                <a:tc>
+                  <a:txBody>
+                    <a:bodyPr/>
+                    <a:lstStyle/>
+                    <a:p>
+                      <a:r>
+                        <a:rPr lang="en-US" sz="1000" dirty="0"/>
+                        <a:t>The </a:t>
+                      </a:r>
+                      <a:r>
+                        <a:rPr lang="en-US" sz="1000" dirty="0" err="1"/>
+                        <a:t>TQuery</a:t>
+                      </a:r>
+                      <a:r>
+                        <a:rPr lang="en-US" sz="1000" dirty="0"/>
+                        <a:t> object state is maintained for subsequent requests. AV-Engine will ask AV-Search for search results [one-by-one] by chapter.</a:t>
+                      </a:r>
+                    </a:p>
+                  </a:txBody>
+                  <a:tcPr/>
+                </a:tc>
+                <a:extLst>
+                  <a:ext uri="{0D108BD9-81ED-4DB2-BD59-A6C34878D82A}">
+                    <a16:rowId xmlns:a16="http://schemas.microsoft.com/office/drawing/2014/main" val="491462801"/>
+                  </a:ext>
+                </a:extLst>
+              </a:tr>
+              <a:tr h="370840">
+                <a:tc>
+                  <a:txBody>
+                    <a:bodyPr/>
+                    <a:lstStyle/>
+                    <a:p>
+                      <a:r>
+                        <a:rPr lang="en-US" sz="1000" dirty="0"/>
+                        <a:t>The JSON return payload is called the “</a:t>
+                      </a:r>
+                      <a:r>
+                        <a:rPr lang="en-US" sz="1000" dirty="0" err="1"/>
+                        <a:t>pinshot</a:t>
+                      </a:r>
+                      <a:r>
+                        <a:rPr lang="en-US" sz="1000" dirty="0"/>
+                        <a:t>”</a:t>
+                      </a:r>
+                    </a:p>
+                  </a:txBody>
+                  <a:tcPr/>
+                </a:tc>
+                <a:tc>
+                  <a:txBody>
+                    <a:bodyPr/>
+                    <a:lstStyle/>
+                    <a:p>
+                      <a:r>
+                        <a:rPr lang="en-US" sz="1000" dirty="0"/>
+                        <a:t>The runtime model is called the “blueprint”</a:t>
+                      </a:r>
+                    </a:p>
+                  </a:txBody>
+                  <a:tcPr/>
+                </a:tc>
+                <a:tc>
+                  <a:txBody>
+                    <a:bodyPr/>
+                    <a:lstStyle/>
+                    <a:p>
+                      <a:r>
+                        <a:rPr lang="en-US" sz="1000" dirty="0"/>
+                        <a:t>AV-Engine returns results [search-summary &amp; chapter-details] as requested by user-facing client app of AV-Engine.</a:t>
+                      </a:r>
+                    </a:p>
+                  </a:txBody>
+                  <a:tcPr/>
+                </a:tc>
+                <a:tc>
+                  <a:txBody>
+                    <a:bodyPr/>
+                    <a:lstStyle/>
+                    <a:p>
+                      <a:endParaRPr lang="en-US" sz="1000" dirty="0"/>
+                    </a:p>
+                  </a:txBody>
+                  <a:tcPr/>
+                </a:tc>
+                <a:extLst>
+                  <a:ext uri="{0D108BD9-81ED-4DB2-BD59-A6C34878D82A}">
+                    <a16:rowId xmlns:a16="http://schemas.microsoft.com/office/drawing/2014/main" val="2023693664"/>
+                  </a:ext>
+                </a:extLst>
+              </a:tr>
+            </a:tbl>
+          </a:graphicData>
+        </a:graphic>
+      </p:graphicFrame>
     </p:spTree>
     <p:extLst>
       <p:ext uri="{BB962C8B-B14F-4D97-AF65-F5344CB8AC3E}">

</xml_diff>

<commit_message>
update the roadmap docs
</commit_message>
<xml_diff>
--- a/AVX-Framework.pptx
+++ b/AVX-Framework.pptx
@@ -264,7 +264,7 @@
           <a:p>
             <a:fld id="{00872148-4BA6-4738-8A8B-AEF1C14E9646}" type="datetimeFigureOut">
               <a:rPr lang="en-US" smtClean="0"/>
-              <a:t>12/21/2023</a:t>
+              <a:t>2/14/2024</a:t>
             </a:fld>
             <a:endParaRPr lang="en-US"/>
           </a:p>
@@ -462,7 +462,7 @@
           <a:p>
             <a:fld id="{00872148-4BA6-4738-8A8B-AEF1C14E9646}" type="datetimeFigureOut">
               <a:rPr lang="en-US" smtClean="0"/>
-              <a:t>12/21/2023</a:t>
+              <a:t>2/14/2024</a:t>
             </a:fld>
             <a:endParaRPr lang="en-US"/>
           </a:p>
@@ -670,7 +670,7 @@
           <a:p>
             <a:fld id="{00872148-4BA6-4738-8A8B-AEF1C14E9646}" type="datetimeFigureOut">
               <a:rPr lang="en-US" smtClean="0"/>
-              <a:t>12/21/2023</a:t>
+              <a:t>2/14/2024</a:t>
             </a:fld>
             <a:endParaRPr lang="en-US"/>
           </a:p>
@@ -868,7 +868,7 @@
           <a:p>
             <a:fld id="{00872148-4BA6-4738-8A8B-AEF1C14E9646}" type="datetimeFigureOut">
               <a:rPr lang="en-US" smtClean="0"/>
-              <a:t>12/21/2023</a:t>
+              <a:t>2/14/2024</a:t>
             </a:fld>
             <a:endParaRPr lang="en-US"/>
           </a:p>
@@ -1143,7 +1143,7 @@
           <a:p>
             <a:fld id="{00872148-4BA6-4738-8A8B-AEF1C14E9646}" type="datetimeFigureOut">
               <a:rPr lang="en-US" smtClean="0"/>
-              <a:t>12/21/2023</a:t>
+              <a:t>2/14/2024</a:t>
             </a:fld>
             <a:endParaRPr lang="en-US"/>
           </a:p>
@@ -1408,7 +1408,7 @@
           <a:p>
             <a:fld id="{00872148-4BA6-4738-8A8B-AEF1C14E9646}" type="datetimeFigureOut">
               <a:rPr lang="en-US" smtClean="0"/>
-              <a:t>12/21/2023</a:t>
+              <a:t>2/14/2024</a:t>
             </a:fld>
             <a:endParaRPr lang="en-US"/>
           </a:p>
@@ -1820,7 +1820,7 @@
           <a:p>
             <a:fld id="{00872148-4BA6-4738-8A8B-AEF1C14E9646}" type="datetimeFigureOut">
               <a:rPr lang="en-US" smtClean="0"/>
-              <a:t>12/21/2023</a:t>
+              <a:t>2/14/2024</a:t>
             </a:fld>
             <a:endParaRPr lang="en-US"/>
           </a:p>
@@ -1961,7 +1961,7 @@
           <a:p>
             <a:fld id="{00872148-4BA6-4738-8A8B-AEF1C14E9646}" type="datetimeFigureOut">
               <a:rPr lang="en-US" smtClean="0"/>
-              <a:t>12/21/2023</a:t>
+              <a:t>2/14/2024</a:t>
             </a:fld>
             <a:endParaRPr lang="en-US"/>
           </a:p>
@@ -2074,7 +2074,7 @@
           <a:p>
             <a:fld id="{00872148-4BA6-4738-8A8B-AEF1C14E9646}" type="datetimeFigureOut">
               <a:rPr lang="en-US" smtClean="0"/>
-              <a:t>12/21/2023</a:t>
+              <a:t>2/14/2024</a:t>
             </a:fld>
             <a:endParaRPr lang="en-US"/>
           </a:p>
@@ -2385,7 +2385,7 @@
           <a:p>
             <a:fld id="{00872148-4BA6-4738-8A8B-AEF1C14E9646}" type="datetimeFigureOut">
               <a:rPr lang="en-US" smtClean="0"/>
-              <a:t>12/21/2023</a:t>
+              <a:t>2/14/2024</a:t>
             </a:fld>
             <a:endParaRPr lang="en-US"/>
           </a:p>
@@ -2673,7 +2673,7 @@
           <a:p>
             <a:fld id="{00872148-4BA6-4738-8A8B-AEF1C14E9646}" type="datetimeFigureOut">
               <a:rPr lang="en-US" smtClean="0"/>
-              <a:t>12/21/2023</a:t>
+              <a:t>2/14/2024</a:t>
             </a:fld>
             <a:endParaRPr lang="en-US"/>
           </a:p>
@@ -2914,7 +2914,7 @@
           <a:p>
             <a:fld id="{00872148-4BA6-4738-8A8B-AEF1C14E9646}" type="datetimeFigureOut">
               <a:rPr lang="en-US" smtClean="0"/>
-              <a:t>12/21/2023</a:t>
+              <a:t>2/14/2024</a:t>
             </a:fld>
             <a:endParaRPr lang="en-US"/>
           </a:p>
@@ -3382,15 +3382,14 @@
           <a:p>
             <a:r>
               <a:rPr lang="en-US" dirty="0"/>
-              <a:t>Roadmap to developing user-facing applications</a:t>
+              <a:t>Roadmap of user-facing Apps</a:t>
             </a:r>
           </a:p>
           <a:p>
             <a:r>
-              <a:rPr lang="en-US" sz="1800"/>
-              <a:t>12-21-2023</a:t>
+              <a:rPr lang="en-US" sz="1800" dirty="0"/>
+              <a:t>2-14-2024</a:t>
             </a:r>
-            <a:endParaRPr lang="en-US" sz="1800" dirty="0"/>
           </a:p>
         </p:txBody>
       </p:sp>
@@ -8330,7 +8329,7 @@
             <a:pPr algn="ctr"/>
             <a:r>
               <a:rPr lang="en-US" dirty="0"/>
-              <a:t>AVX Framework Roadmap – 3C19 – CY2023</a:t>
+              <a:t>AVX Framework Roadmap – 4216 – Q1/2024</a:t>
             </a:r>
           </a:p>
         </p:txBody>
@@ -8664,90 +8663,6 @@
       </p:grpSp>
       <p:sp>
         <p:nvSpPr>
-          <p:cNvPr id="32" name="Rectangle 31">
-            <a:extLst>
-              <a:ext uri="{FF2B5EF4-FFF2-40B4-BE49-F238E27FC236}">
-                <a16:creationId xmlns:a16="http://schemas.microsoft.com/office/drawing/2014/main" id="{E2B92447-846B-AE7D-3D74-D7EDF6C28A01}"/>
-              </a:ext>
-            </a:extLst>
-          </p:cNvPr>
-          <p:cNvSpPr/>
-          <p:nvPr/>
-        </p:nvSpPr>
-        <p:spPr>
-          <a:xfrm>
-            <a:off x="3075448" y="2582246"/>
-            <a:ext cx="1575459" cy="979714"/>
-          </a:xfrm>
-          <a:prstGeom prst="rect">
-            <a:avLst/>
-          </a:prstGeom>
-          <a:solidFill>
-            <a:srgbClr val="385723"/>
-          </a:solidFill>
-        </p:spPr>
-        <p:style>
-          <a:lnRef idx="2">
-            <a:schemeClr val="accent1">
-              <a:shade val="50000"/>
-            </a:schemeClr>
-          </a:lnRef>
-          <a:fillRef idx="1">
-            <a:schemeClr val="accent1"/>
-          </a:fillRef>
-          <a:effectRef idx="0">
-            <a:schemeClr val="accent1"/>
-          </a:effectRef>
-          <a:fontRef idx="minor">
-            <a:schemeClr val="lt1"/>
-          </a:fontRef>
-        </p:style>
-        <p:txBody>
-          <a:bodyPr rtlCol="0" anchor="ctr"/>
-          <a:lstStyle/>
-          <a:p>
-            <a:pPr algn="ctr"/>
-            <a:r>
-              <a:rPr lang="en-US" sz="800" dirty="0"/>
-              <a:t>http://github.com/kwonus </a:t>
-            </a:r>
-          </a:p>
-          <a:p>
-            <a:pPr algn="ctr"/>
-            <a:r>
-              <a:rPr lang="en-US" sz="800" dirty="0"/>
-              <a:t>&lt;&lt; C# / x64 &gt;&gt;</a:t>
-            </a:r>
-          </a:p>
-          <a:p>
-            <a:pPr algn="ctr"/>
-            <a:r>
-              <a:rPr lang="en-US" dirty="0"/>
-              <a:t>AV-Bible</a:t>
-            </a:r>
-          </a:p>
-          <a:p>
-            <a:pPr algn="ctr"/>
-            <a:r>
-              <a:rPr lang="en-US" sz="800" dirty="0"/>
-              <a:t>[WPF Windows only BETA]</a:t>
-            </a:r>
-          </a:p>
-          <a:p>
-            <a:pPr algn="ctr"/>
-            <a:endParaRPr lang="en-US" sz="800" dirty="0"/>
-          </a:p>
-          <a:p>
-            <a:pPr algn="ctr"/>
-            <a:r>
-              <a:rPr lang="en-US" sz="800" dirty="0"/>
-              <a:t>Q4/2023</a:t>
-            </a:r>
-          </a:p>
-        </p:txBody>
-      </p:sp>
-      <p:sp>
-        <p:nvSpPr>
           <p:cNvPr id="33" name="Rectangle 32">
             <a:extLst>
               <a:ext uri="{FF2B5EF4-FFF2-40B4-BE49-F238E27FC236}">
@@ -8760,7 +8675,7 @@
         </p:nvSpPr>
         <p:spPr>
           <a:xfrm>
-            <a:off x="3075447" y="3819497"/>
+            <a:off x="3169328" y="3208789"/>
             <a:ext cx="1575459" cy="979714"/>
           </a:xfrm>
           <a:prstGeom prst="rect">
@@ -8816,7 +8731,7 @@
             <a:pPr algn="ctr"/>
             <a:r>
               <a:rPr lang="en-US" sz="800" dirty="0"/>
-              <a:t>[Windows-Only BETA]</a:t>
+              <a:t>[Windows-Only]</a:t>
             </a:r>
           </a:p>
           <a:p>
@@ -8827,7 +8742,7 @@
             <a:pPr algn="ctr"/>
             <a:r>
               <a:rPr lang="en-US" sz="800" dirty="0"/>
-              <a:t>Q4/2023</a:t>
+              <a:t>Q1/2024</a:t>
             </a:r>
           </a:p>
         </p:txBody>
@@ -8849,102 +8764,8 @@
         </p:nvCxnSpPr>
         <p:spPr>
           <a:xfrm>
-            <a:off x="2385514" y="3824971"/>
-            <a:ext cx="689933" cy="484383"/>
-          </a:xfrm>
-          <a:prstGeom prst="straightConnector1">
-            <a:avLst/>
-          </a:prstGeom>
-          <a:ln>
-            <a:solidFill>
-              <a:schemeClr val="tx1">
-                <a:lumMod val="65000"/>
-                <a:lumOff val="35000"/>
-              </a:schemeClr>
-            </a:solidFill>
-            <a:tailEnd type="triangle"/>
-          </a:ln>
-        </p:spPr>
-        <p:style>
-          <a:lnRef idx="1">
-            <a:schemeClr val="accent1"/>
-          </a:lnRef>
-          <a:fillRef idx="0">
-            <a:schemeClr val="accent1"/>
-          </a:fillRef>
-          <a:effectRef idx="0">
-            <a:schemeClr val="accent1"/>
-          </a:effectRef>
-          <a:fontRef idx="minor">
-            <a:schemeClr val="tx1"/>
-          </a:fontRef>
-        </p:style>
-      </p:cxnSp>
-      <p:cxnSp>
-        <p:nvCxnSpPr>
-          <p:cNvPr id="37" name="Straight Arrow Connector 169">
-            <a:extLst>
-              <a:ext uri="{FF2B5EF4-FFF2-40B4-BE49-F238E27FC236}">
-                <a16:creationId xmlns:a16="http://schemas.microsoft.com/office/drawing/2014/main" id="{BDF848F1-2A38-3A36-0ABE-3BA5E422CF97}"/>
-              </a:ext>
-            </a:extLst>
-          </p:cNvPr>
-          <p:cNvCxnSpPr>
-            <a:cxnSpLocks/>
-          </p:cNvCxnSpPr>
-          <p:nvPr/>
-        </p:nvCxnSpPr>
-        <p:spPr>
-          <a:xfrm flipV="1">
-            <a:off x="2406258" y="3062506"/>
-            <a:ext cx="669189" cy="464600"/>
-          </a:xfrm>
-          <a:prstGeom prst="straightConnector1">
-            <a:avLst/>
-          </a:prstGeom>
-          <a:ln>
-            <a:solidFill>
-              <a:schemeClr val="tx1">
-                <a:lumMod val="65000"/>
-                <a:lumOff val="35000"/>
-              </a:schemeClr>
-            </a:solidFill>
-            <a:tailEnd type="triangle"/>
-          </a:ln>
-        </p:spPr>
-        <p:style>
-          <a:lnRef idx="1">
-            <a:schemeClr val="accent1"/>
-          </a:lnRef>
-          <a:fillRef idx="0">
-            <a:schemeClr val="accent1"/>
-          </a:fillRef>
-          <a:effectRef idx="0">
-            <a:schemeClr val="accent1"/>
-          </a:effectRef>
-          <a:fontRef idx="minor">
-            <a:schemeClr val="tx1"/>
-          </a:fontRef>
-        </p:style>
-      </p:cxnSp>
-      <p:cxnSp>
-        <p:nvCxnSpPr>
-          <p:cNvPr id="38" name="Straight Arrow Connector 169">
-            <a:extLst>
-              <a:ext uri="{FF2B5EF4-FFF2-40B4-BE49-F238E27FC236}">
-                <a16:creationId xmlns:a16="http://schemas.microsoft.com/office/drawing/2014/main" id="{8FFDE091-1827-1FDD-A758-A617806D8DA1}"/>
-              </a:ext>
-            </a:extLst>
-          </p:cNvPr>
-          <p:cNvCxnSpPr>
-            <a:cxnSpLocks/>
-          </p:cNvCxnSpPr>
-          <p:nvPr/>
-        </p:nvCxnSpPr>
-        <p:spPr>
-          <a:xfrm>
-            <a:off x="4650906" y="3385859"/>
-            <a:ext cx="1855452" cy="0"/>
+            <a:off x="2462327" y="3698646"/>
+            <a:ext cx="707001" cy="0"/>
           </a:xfrm>
           <a:prstGeom prst="straightConnector1">
             <a:avLst/>
@@ -8985,13 +8806,15 @@
           </p:cNvPr>
           <p:cNvCxnSpPr>
             <a:cxnSpLocks/>
+            <a:stCxn id="33" idx="3"/>
+            <a:endCxn id="26" idx="1"/>
           </p:cNvCxnSpPr>
           <p:nvPr/>
         </p:nvCxnSpPr>
         <p:spPr>
           <a:xfrm>
-            <a:off x="4650906" y="4028206"/>
-            <a:ext cx="1846916" cy="0"/>
+            <a:off x="4744787" y="3698646"/>
+            <a:ext cx="1773698" cy="3538"/>
           </a:xfrm>
           <a:prstGeom prst="straightConnector1">
             <a:avLst/>
@@ -10440,7 +10263,7 @@
             <a:pPr algn="ctr"/>
             <a:r>
               <a:rPr lang="en-US" dirty="0"/>
-              <a:t>AVX Framework Roadmap – 3C19 – CY2024</a:t>
+              <a:t>AVX Framework Roadmap – 4216 – CY2024</a:t>
             </a:r>
           </a:p>
         </p:txBody>
@@ -11064,6 +10887,13 @@
             <a:pPr algn="ctr"/>
             <a:r>
               <a:rPr lang="en-US" dirty="0"/>
+              <a:t>Q2</a:t>
+            </a:r>
+          </a:p>
+          <a:p>
+            <a:pPr algn="ctr"/>
+            <a:r>
+              <a:rPr lang="en-US" dirty="0"/>
               <a:t>AV-Bible</a:t>
             </a:r>
           </a:p>
@@ -11073,6 +10903,10 @@
               <a:rPr lang="en-US" sz="800" dirty="0"/>
               <a:t>[WPF Windows Desktop App]</a:t>
             </a:r>
+          </a:p>
+          <a:p>
+            <a:pPr algn="ctr"/>
+            <a:endParaRPr lang="en-US" sz="800" dirty="0"/>
           </a:p>
         </p:txBody>
       </p:sp>
@@ -11154,8 +10988,63 @@
                 <a:ea typeface="+mn-ea"/>
                 <a:cs typeface="+mn-cs"/>
               </a:rPr>
+              <a:t>Q3</a:t>
+            </a:r>
+          </a:p>
+          <a:p>
+            <a:pPr marL="0" marR="0" lvl="0" indent="0" algn="ctr" defTabSz="914400" rtl="0" eaLnBrk="1" fontAlgn="auto" latinLnBrk="0" hangingPunct="1">
+              <a:lnSpc>
+                <a:spcPct val="100000"/>
+              </a:lnSpc>
+              <a:spcBef>
+                <a:spcPts val="0"/>
+              </a:spcBef>
+              <a:spcAft>
+                <a:spcPts val="0"/>
+              </a:spcAft>
+              <a:buClrTx/>
+              <a:buSzTx/>
+              <a:buFontTx/>
+              <a:buNone/>
+              <a:tabLst/>
+              <a:defRPr/>
+            </a:pPr>
+            <a:r>
+              <a:rPr kumimoji="0" lang="en-US" sz="1800" b="0" i="0" u="none" strike="noStrike" kern="1200" cap="none" spc="0" normalizeH="0" baseline="0" noProof="0" dirty="0">
+                <a:ln>
+                  <a:noFill/>
+                </a:ln>
+                <a:solidFill>
+                  <a:prstClr val="white"/>
+                </a:solidFill>
+                <a:effectLst/>
+                <a:uLnTx/>
+                <a:uFillTx/>
+                <a:latin typeface="Calibri" panose="020F0502020204030204"/>
+                <a:ea typeface="+mn-ea"/>
+                <a:cs typeface="+mn-cs"/>
+              </a:rPr>
               <a:t>AV-Bible-Web</a:t>
             </a:r>
+          </a:p>
+          <a:p>
+            <a:pPr marL="0" marR="0" lvl="0" indent="0" algn="ctr" defTabSz="914400" rtl="0" eaLnBrk="1" fontAlgn="auto" latinLnBrk="0" hangingPunct="1">
+              <a:lnSpc>
+                <a:spcPct val="100000"/>
+              </a:lnSpc>
+              <a:spcBef>
+                <a:spcPts val="0"/>
+              </a:spcBef>
+              <a:spcAft>
+                <a:spcPts val="0"/>
+              </a:spcAft>
+              <a:buClrTx/>
+              <a:buSzTx/>
+              <a:buFontTx/>
+              <a:buNone/>
+              <a:tabLst/>
+              <a:defRPr/>
+            </a:pPr>
             <a:endParaRPr kumimoji="0" lang="en-US" sz="800" b="0" i="0" u="none" strike="noStrike" kern="1200" cap="none" spc="0" normalizeH="0" baseline="0" noProof="0" dirty="0">
               <a:ln>
                 <a:noFill/>
@@ -11319,6 +11208,13 @@
             <a:pPr algn="ctr"/>
             <a:r>
               <a:rPr lang="en-US" dirty="0"/>
+              <a:t>Q3</a:t>
+            </a:r>
+          </a:p>
+          <a:p>
+            <a:pPr algn="ctr"/>
+            <a:r>
+              <a:rPr lang="en-US" dirty="0"/>
               <a:t>AV-API</a:t>
             </a:r>
           </a:p>
@@ -11336,6 +11232,10 @@
               <a:rPr lang="en-US" sz="800" dirty="0"/>
               <a:t> / REST]</a:t>
             </a:r>
+          </a:p>
+          <a:p>
+            <a:pPr algn="ctr"/>
+            <a:endParaRPr lang="en-US" sz="800" dirty="0"/>
           </a:p>
         </p:txBody>
       </p:sp>
@@ -11493,6 +11393,13 @@
             <a:pPr algn="ctr"/>
             <a:r>
               <a:rPr lang="en-US" dirty="0"/>
+              <a:t>Q4</a:t>
+            </a:r>
+          </a:p>
+          <a:p>
+            <a:pPr algn="ctr"/>
+            <a:r>
+              <a:rPr lang="en-US" dirty="0"/>
               <a:t>AV-Word</a:t>
             </a:r>
           </a:p>
@@ -11510,6 +11417,10 @@
               <a:rPr lang="en-US" sz="800" dirty="0"/>
               <a:t>]</a:t>
             </a:r>
+          </a:p>
+          <a:p>
+            <a:pPr algn="ctr"/>
+            <a:endParaRPr lang="en-US" sz="800" dirty="0"/>
           </a:p>
         </p:txBody>
       </p:sp>

</xml_diff>

<commit_message>
update the roadmap pic for 2024
</commit_message>
<xml_diff>
--- a/AVX-Framework.pptx
+++ b/AVX-Framework.pptx
@@ -10623,6 +10623,7 @@
               </a:extLst>
             </p:cNvPr>
             <p:cNvCxnSpPr>
+              <a:cxnSpLocks/>
               <a:stCxn id="239" idx="0"/>
             </p:cNvCxnSpPr>
             <p:nvPr/>
@@ -11045,6 +11046,90 @@
               <a:tabLst/>
               <a:defRPr/>
             </a:pPr>
+            <a:r>
+              <a:rPr kumimoji="0" lang="en-US" sz="800" b="0" i="0" u="none" strike="noStrike" kern="1200" cap="none" spc="0" normalizeH="0" baseline="0" noProof="0" dirty="0">
+                <a:ln>
+                  <a:noFill/>
+                </a:ln>
+                <a:solidFill>
+                  <a:prstClr val="white"/>
+                </a:solidFill>
+                <a:effectLst/>
+                <a:uLnTx/>
+                <a:uFillTx/>
+                <a:latin typeface="Calibri" panose="020F0502020204030204"/>
+                <a:ea typeface="+mn-ea"/>
+                <a:cs typeface="+mn-cs"/>
+              </a:rPr>
+              <a:t>[</a:t>
+            </a:r>
+            <a:r>
+              <a:rPr kumimoji="0" lang="en-US" sz="800" b="0" i="0" u="none" strike="noStrike" kern="1200" cap="none" spc="0" normalizeH="0" baseline="0" noProof="0" dirty="0" err="1">
+                <a:ln>
+                  <a:noFill/>
+                </a:ln>
+                <a:solidFill>
+                  <a:prstClr val="white"/>
+                </a:solidFill>
+                <a:effectLst/>
+                <a:uLnTx/>
+                <a:uFillTx/>
+                <a:latin typeface="Calibri" panose="020F0502020204030204"/>
+                <a:ea typeface="+mn-ea"/>
+                <a:cs typeface="+mn-cs"/>
+              </a:rPr>
+              <a:t>Blazor</a:t>
+            </a:r>
+            <a:r>
+              <a:rPr kumimoji="0" lang="en-US" sz="800" b="0" i="0" u="none" strike="noStrike" kern="1200" cap="none" spc="0" normalizeH="0" baseline="0" noProof="0" dirty="0">
+                <a:ln>
+                  <a:noFill/>
+                </a:ln>
+                <a:solidFill>
+                  <a:prstClr val="white"/>
+                </a:solidFill>
+                <a:effectLst/>
+                <a:uLnTx/>
+                <a:uFillTx/>
+                <a:latin typeface="Calibri" panose="020F0502020204030204"/>
+                <a:ea typeface="+mn-ea"/>
+                <a:cs typeface="+mn-cs"/>
+              </a:rPr>
+              <a:t>/Razor]</a:t>
+            </a:r>
+            <a:endParaRPr kumimoji="0" lang="en-US" sz="1800" b="0" i="0" u="none" strike="noStrike" kern="1200" cap="none" spc="0" normalizeH="0" baseline="0" noProof="0" dirty="0">
+              <a:ln>
+                <a:noFill/>
+              </a:ln>
+              <a:solidFill>
+                <a:prstClr val="white"/>
+              </a:solidFill>
+              <a:effectLst/>
+              <a:uLnTx/>
+              <a:uFillTx/>
+              <a:latin typeface="Calibri" panose="020F0502020204030204"/>
+              <a:ea typeface="+mn-ea"/>
+              <a:cs typeface="+mn-cs"/>
+            </a:endParaRPr>
+          </a:p>
+          <a:p>
+            <a:pPr marL="0" marR="0" lvl="0" indent="0" algn="ctr" defTabSz="914400" rtl="0" eaLnBrk="1" fontAlgn="auto" latinLnBrk="0" hangingPunct="1">
+              <a:lnSpc>
+                <a:spcPct val="100000"/>
+              </a:lnSpc>
+              <a:spcBef>
+                <a:spcPts val="0"/>
+              </a:spcBef>
+              <a:spcAft>
+                <a:spcPts val="0"/>
+              </a:spcAft>
+              <a:buClrTx/>
+              <a:buSzTx/>
+              <a:buFontTx/>
+              <a:buNone/>
+              <a:tabLst/>
+              <a:defRPr/>
+            </a:pPr>
             <a:endParaRPr kumimoji="0" lang="en-US" sz="800" b="0" i="0" u="none" strike="noStrike" kern="1200" cap="none" spc="0" normalizeH="0" baseline="0" noProof="0" dirty="0">
               <a:ln>
                 <a:noFill/>
@@ -11081,55 +11166,6 @@
           <a:xfrm>
             <a:off x="3479800" y="2213616"/>
             <a:ext cx="444954" cy="0"/>
-          </a:xfrm>
-          <a:prstGeom prst="straightConnector1">
-            <a:avLst/>
-          </a:prstGeom>
-          <a:ln>
-            <a:solidFill>
-              <a:schemeClr val="tx1">
-                <a:lumMod val="65000"/>
-                <a:lumOff val="35000"/>
-              </a:schemeClr>
-            </a:solidFill>
-            <a:tailEnd type="triangle"/>
-          </a:ln>
-        </p:spPr>
-        <p:style>
-          <a:lnRef idx="1">
-            <a:schemeClr val="accent1"/>
-          </a:lnRef>
-          <a:fillRef idx="0">
-            <a:schemeClr val="accent1"/>
-          </a:fillRef>
-          <a:effectRef idx="0">
-            <a:schemeClr val="accent1"/>
-          </a:effectRef>
-          <a:fontRef idx="minor">
-            <a:schemeClr val="tx1"/>
-          </a:fontRef>
-        </p:style>
-      </p:cxnSp>
-      <p:cxnSp>
-        <p:nvCxnSpPr>
-          <p:cNvPr id="120" name="Straight Arrow Connector 169">
-            <a:extLst>
-              <a:ext uri="{FF2B5EF4-FFF2-40B4-BE49-F238E27FC236}">
-                <a16:creationId xmlns:a16="http://schemas.microsoft.com/office/drawing/2014/main" id="{7769E101-0CF8-EFE6-3CE7-287BC4CD5B73}"/>
-              </a:ext>
-            </a:extLst>
-          </p:cNvPr>
-          <p:cNvCxnSpPr>
-            <a:cxnSpLocks/>
-            <a:stCxn id="112" idx="2"/>
-            <a:endCxn id="10" idx="0"/>
-          </p:cNvCxnSpPr>
-          <p:nvPr/>
-        </p:nvCxnSpPr>
-        <p:spPr>
-          <a:xfrm flipH="1">
-            <a:off x="4687044" y="4152715"/>
-            <a:ext cx="3004" cy="471301"/>
           </a:xfrm>
           <a:prstGeom prst="straightConnector1">
             <a:avLst/>
@@ -11208,7 +11244,7 @@
             <a:pPr algn="ctr"/>
             <a:r>
               <a:rPr lang="en-US" dirty="0"/>
-              <a:t>Q3</a:t>
+              <a:t>Q4</a:t>
             </a:r>
           </a:p>
           <a:p>
@@ -11823,139 +11859,6 @@
       </p:cxnSp>
       <p:sp>
         <p:nvSpPr>
-          <p:cNvPr id="35" name="TextBox 34">
-            <a:extLst>
-              <a:ext uri="{FF2B5EF4-FFF2-40B4-BE49-F238E27FC236}">
-                <a16:creationId xmlns:a16="http://schemas.microsoft.com/office/drawing/2014/main" id="{5DC61E03-FF78-DFF9-4187-F15C7A758D43}"/>
-              </a:ext>
-            </a:extLst>
-          </p:cNvPr>
-          <p:cNvSpPr txBox="1"/>
-          <p:nvPr/>
-        </p:nvSpPr>
-        <p:spPr>
-          <a:xfrm>
-            <a:off x="4662157" y="4247778"/>
-            <a:ext cx="410637" cy="215444"/>
-          </a:xfrm>
-          <a:prstGeom prst="rect">
-            <a:avLst/>
-          </a:prstGeom>
-          <a:noFill/>
-        </p:spPr>
-        <p:txBody>
-          <a:bodyPr wrap="square" rtlCol="0">
-            <a:spAutoFit/>
-          </a:bodyPr>
-          <a:lstStyle/>
-          <a:p>
-            <a:pPr algn="ctr"/>
-            <a:r>
-              <a:rPr lang="en-US" sz="800" dirty="0" err="1">
-                <a:solidFill>
-                  <a:schemeClr val="tx1">
-                    <a:lumMod val="50000"/>
-                    <a:lumOff val="50000"/>
-                  </a:schemeClr>
-                </a:solidFill>
-              </a:rPr>
-              <a:t>json</a:t>
-            </a:r>
-            <a:endParaRPr lang="en-US" sz="800" dirty="0">
-              <a:solidFill>
-                <a:schemeClr val="tx1">
-                  <a:lumMod val="50000"/>
-                  <a:lumOff val="50000"/>
-                </a:schemeClr>
-              </a:solidFill>
-            </a:endParaRPr>
-          </a:p>
-        </p:txBody>
-      </p:sp>
-      <p:cxnSp>
-        <p:nvCxnSpPr>
-          <p:cNvPr id="36" name="Connector: Elbow 5">
-            <a:extLst>
-              <a:ext uri="{FF2B5EF4-FFF2-40B4-BE49-F238E27FC236}">
-                <a16:creationId xmlns:a16="http://schemas.microsoft.com/office/drawing/2014/main" id="{2BBE9138-9DF7-AF81-1212-A3E397813612}"/>
-              </a:ext>
-            </a:extLst>
-          </p:cNvPr>
-          <p:cNvCxnSpPr>
-            <a:cxnSpLocks/>
-          </p:cNvCxnSpPr>
-          <p:nvPr/>
-        </p:nvCxnSpPr>
-        <p:spPr>
-          <a:xfrm flipV="1">
-            <a:off x="4867476" y="4171860"/>
-            <a:ext cx="0" cy="143948"/>
-          </a:xfrm>
-          <a:prstGeom prst="straightConnector1">
-            <a:avLst/>
-          </a:prstGeom>
-          <a:ln>
-            <a:tailEnd type="triangle"/>
-          </a:ln>
-        </p:spPr>
-        <p:style>
-          <a:lnRef idx="1">
-            <a:schemeClr val="accent1"/>
-          </a:lnRef>
-          <a:fillRef idx="0">
-            <a:schemeClr val="accent1"/>
-          </a:fillRef>
-          <a:effectRef idx="0">
-            <a:schemeClr val="accent1"/>
-          </a:effectRef>
-          <a:fontRef idx="minor">
-            <a:schemeClr val="tx1"/>
-          </a:fontRef>
-        </p:style>
-      </p:cxnSp>
-      <p:cxnSp>
-        <p:nvCxnSpPr>
-          <p:cNvPr id="45" name="Connector: Elbow 5">
-            <a:extLst>
-              <a:ext uri="{FF2B5EF4-FFF2-40B4-BE49-F238E27FC236}">
-                <a16:creationId xmlns:a16="http://schemas.microsoft.com/office/drawing/2014/main" id="{59DDAC9C-1E48-285E-0AED-97C2522CF8E1}"/>
-              </a:ext>
-            </a:extLst>
-          </p:cNvPr>
-          <p:cNvCxnSpPr>
-            <a:cxnSpLocks/>
-          </p:cNvCxnSpPr>
-          <p:nvPr/>
-        </p:nvCxnSpPr>
-        <p:spPr>
-          <a:xfrm>
-            <a:off x="4867476" y="4453898"/>
-            <a:ext cx="0" cy="143948"/>
-          </a:xfrm>
-          <a:prstGeom prst="straightConnector1">
-            <a:avLst/>
-          </a:prstGeom>
-          <a:ln>
-            <a:tailEnd type="triangle"/>
-          </a:ln>
-        </p:spPr>
-        <p:style>
-          <a:lnRef idx="1">
-            <a:schemeClr val="accent1"/>
-          </a:lnRef>
-          <a:fillRef idx="0">
-            <a:schemeClr val="accent1"/>
-          </a:fillRef>
-          <a:effectRef idx="0">
-            <a:schemeClr val="accent1"/>
-          </a:effectRef>
-          <a:fontRef idx="minor">
-            <a:schemeClr val="tx1"/>
-          </a:fontRef>
-        </p:style>
-      </p:cxnSp>
-      <p:sp>
-        <p:nvSpPr>
           <p:cNvPr id="104" name="TextBox 103">
             <a:extLst>
               <a:ext uri="{FF2B5EF4-FFF2-40B4-BE49-F238E27FC236}">
@@ -11994,46 +11897,109 @@
           </a:p>
         </p:txBody>
       </p:sp>
-      <p:sp>
-        <p:nvSpPr>
-          <p:cNvPr id="105" name="TextBox 104">
+      <p:cxnSp>
+        <p:nvCxnSpPr>
+          <p:cNvPr id="3" name="Straight Arrow Connector 89">
             <a:extLst>
               <a:ext uri="{FF2B5EF4-FFF2-40B4-BE49-F238E27FC236}">
-                <a16:creationId xmlns:a16="http://schemas.microsoft.com/office/drawing/2014/main" id="{3E8651E6-EA64-E436-13CE-212F08ED3E59}"/>
+                <a16:creationId xmlns:a16="http://schemas.microsoft.com/office/drawing/2014/main" id="{67F43FC6-7DFC-E576-1BE9-62D71430AB12}"/>
               </a:ext>
             </a:extLst>
           </p:cNvPr>
-          <p:cNvSpPr txBox="1"/>
+          <p:cNvCxnSpPr>
+            <a:cxnSpLocks/>
+            <a:endCxn id="112" idx="3"/>
+          </p:cNvCxnSpPr>
           <p:nvPr/>
-        </p:nvSpPr>
+        </p:nvCxnSpPr>
         <p:spPr>
-          <a:xfrm>
-            <a:off x="4083876" y="4260795"/>
-            <a:ext cx="847656" cy="246221"/>
+          <a:xfrm rot="10800000" flipV="1">
+            <a:off x="5477777" y="3660120"/>
+            <a:ext cx="1530430" cy="2737"/>
           </a:xfrm>
-          <a:prstGeom prst="rect">
-            <a:avLst/>
+          <a:prstGeom prst="bentConnector3">
+            <a:avLst>
+              <a:gd name="adj1" fmla="val 98595"/>
+            </a:avLst>
           </a:prstGeom>
-          <a:noFill/>
+          <a:ln>
+            <a:solidFill>
+              <a:schemeClr val="tx1">
+                <a:lumMod val="65000"/>
+                <a:lumOff val="35000"/>
+              </a:schemeClr>
+            </a:solidFill>
+            <a:headEnd type="triangle"/>
+            <a:tailEnd type="none"/>
+          </a:ln>
         </p:spPr>
-        <p:txBody>
-          <a:bodyPr wrap="square" rtlCol="0">
-            <a:spAutoFit/>
-          </a:bodyPr>
-          <a:lstStyle/>
-          <a:p>
-            <a:pPr algn="ctr"/>
-            <a:r>
-              <a:rPr lang="en-US" sz="1000" dirty="0">
-                <a:solidFill>
-                  <a:schemeClr val="accent1"/>
-                </a:solidFill>
-              </a:rPr>
-              <a:t>REST</a:t>
-            </a:r>
-          </a:p>
-        </p:txBody>
-      </p:sp>
+        <p:style>
+          <a:lnRef idx="1">
+            <a:schemeClr val="accent1"/>
+          </a:lnRef>
+          <a:fillRef idx="0">
+            <a:schemeClr val="accent1"/>
+          </a:fillRef>
+          <a:effectRef idx="0">
+            <a:schemeClr val="accent1"/>
+          </a:effectRef>
+          <a:fontRef idx="minor">
+            <a:schemeClr val="tx1"/>
+          </a:fontRef>
+        </p:style>
+      </p:cxnSp>
+      <p:cxnSp>
+        <p:nvCxnSpPr>
+          <p:cNvPr id="15" name="Straight Arrow Connector 89">
+            <a:extLst>
+              <a:ext uri="{FF2B5EF4-FFF2-40B4-BE49-F238E27FC236}">
+                <a16:creationId xmlns:a16="http://schemas.microsoft.com/office/drawing/2014/main" id="{9381B02E-1F3C-E0D3-EEFD-92D882035E00}"/>
+              </a:ext>
+            </a:extLst>
+          </p:cNvPr>
+          <p:cNvCxnSpPr>
+            <a:cxnSpLocks/>
+            <a:stCxn id="112" idx="2"/>
+            <a:endCxn id="10" idx="0"/>
+          </p:cNvCxnSpPr>
+          <p:nvPr/>
+        </p:nvCxnSpPr>
+        <p:spPr>
+          <a:xfrm rot="5400000">
+            <a:off x="4452896" y="4386863"/>
+            <a:ext cx="471301" cy="3004"/>
+          </a:xfrm>
+          <a:prstGeom prst="bentConnector3">
+            <a:avLst>
+              <a:gd name="adj1" fmla="val 50000"/>
+            </a:avLst>
+          </a:prstGeom>
+          <a:ln>
+            <a:solidFill>
+              <a:schemeClr val="tx1">
+                <a:lumMod val="65000"/>
+                <a:lumOff val="35000"/>
+              </a:schemeClr>
+            </a:solidFill>
+            <a:headEnd type="triangle"/>
+            <a:tailEnd type="none"/>
+          </a:ln>
+        </p:spPr>
+        <p:style>
+          <a:lnRef idx="1">
+            <a:schemeClr val="accent1"/>
+          </a:lnRef>
+          <a:fillRef idx="0">
+            <a:schemeClr val="accent1"/>
+          </a:fillRef>
+          <a:effectRef idx="0">
+            <a:schemeClr val="accent1"/>
+          </a:effectRef>
+          <a:fontRef idx="minor">
+            <a:schemeClr val="tx1"/>
+          </a:fontRef>
+        </p:style>
+      </p:cxnSp>
     </p:spTree>
     <p:extLst>
       <p:ext uri="{BB962C8B-B14F-4D97-AF65-F5344CB8AC3E}">

</xml_diff>